<commit_message>
more for week 3
</commit_message>
<xml_diff>
--- a/Lectures/IS452Fall2017Week01.pptx
+++ b/Lectures/IS452Fall2017Week01.pptx
@@ -3844,6 +3844,13 @@
   <p:clrMapOvr>
     <a:masterClrMapping/>
   </p:clrMapOvr>
+  <p:timing>
+    <p:tnLst>
+      <p:par>
+        <p:cTn id="1" dur="indefinite" restart="never" nodeType="tmRoot"/>
+      </p:par>
+    </p:tnLst>
+  </p:timing>
 </p:sld>
 </file>
 
@@ -4027,6 +4034,13 @@
   <p:clrMapOvr>
     <a:masterClrMapping/>
   </p:clrMapOvr>
+  <p:timing>
+    <p:tnLst>
+      <p:par>
+        <p:cTn id="1" dur="indefinite" restart="never" nodeType="tmRoot"/>
+      </p:par>
+    </p:tnLst>
+  </p:timing>
 </p:sld>
 </file>
 
@@ -4248,6 +4262,13 @@
   <p:clrMapOvr>
     <a:masterClrMapping/>
   </p:clrMapOvr>
+  <p:timing>
+    <p:tnLst>
+      <p:par>
+        <p:cTn id="1" dur="indefinite" restart="never" nodeType="tmRoot"/>
+      </p:par>
+    </p:tnLst>
+  </p:timing>
 </p:sld>
 </file>
 
@@ -4380,6 +4401,13 @@
   <p:clrMapOvr>
     <a:masterClrMapping/>
   </p:clrMapOvr>
+  <p:timing>
+    <p:tnLst>
+      <p:par>
+        <p:cTn id="1" dur="indefinite" restart="never" nodeType="tmRoot"/>
+      </p:par>
+    </p:tnLst>
+  </p:timing>
 </p:sld>
 </file>
 
@@ -4553,6 +4581,13 @@
   <p:clrMapOvr>
     <a:masterClrMapping/>
   </p:clrMapOvr>
+  <p:timing>
+    <p:tnLst>
+      <p:par>
+        <p:cTn id="1" dur="indefinite" restart="never" nodeType="tmRoot"/>
+      </p:par>
+    </p:tnLst>
+  </p:timing>
 </p:sld>
 </file>
 
@@ -4690,6 +4725,13 @@
   <p:clrMapOvr>
     <a:masterClrMapping/>
   </p:clrMapOvr>
+  <p:timing>
+    <p:tnLst>
+      <p:par>
+        <p:cTn id="1" dur="indefinite" restart="never" nodeType="tmRoot"/>
+      </p:par>
+    </p:tnLst>
+  </p:timing>
 </p:sld>
 </file>
 
@@ -4863,6 +4905,13 @@
   <p:clrMapOvr>
     <a:masterClrMapping/>
   </p:clrMapOvr>
+  <p:timing>
+    <p:tnLst>
+      <p:par>
+        <p:cTn id="1" dur="indefinite" restart="never" nodeType="tmRoot"/>
+      </p:par>
+    </p:tnLst>
+  </p:timing>
 </p:sld>
 </file>
 
@@ -4995,6 +5044,13 @@
   <p:clrMapOvr>
     <a:masterClrMapping/>
   </p:clrMapOvr>
+  <p:timing>
+    <p:tnLst>
+      <p:par>
+        <p:cTn id="1" dur="indefinite" restart="never" nodeType="tmRoot"/>
+      </p:par>
+    </p:tnLst>
+  </p:timing>
 </p:sld>
 </file>
 
@@ -5202,6 +5258,13 @@
   <p:clrMapOvr>
     <a:masterClrMapping/>
   </p:clrMapOvr>
+  <p:timing>
+    <p:tnLst>
+      <p:par>
+        <p:cTn id="1" dur="indefinite" restart="never" nodeType="tmRoot"/>
+      </p:par>
+    </p:tnLst>
+  </p:timing>
 </p:sld>
 </file>
 
@@ -5298,6 +5361,13 @@
   <p:clrMapOvr>
     <a:masterClrMapping/>
   </p:clrMapOvr>
+  <p:timing>
+    <p:tnLst>
+      <p:par>
+        <p:cTn id="1" dur="indefinite" restart="never" nodeType="tmRoot"/>
+      </p:par>
+    </p:tnLst>
+  </p:timing>
 </p:sld>
 </file>
 
@@ -5380,6 +5450,13 @@
   <p:clrMapOvr>
     <a:masterClrMapping/>
   </p:clrMapOvr>
+  <p:timing>
+    <p:tnLst>
+      <p:par>
+        <p:cTn id="1" dur="indefinite" restart="never" nodeType="tmRoot"/>
+      </p:par>
+    </p:tnLst>
+  </p:timing>
 </p:sld>
 </file>
 
@@ -5551,6 +5628,13 @@
   <p:clrMapOvr>
     <a:masterClrMapping/>
   </p:clrMapOvr>
+  <p:timing>
+    <p:tnLst>
+      <p:par>
+        <p:cTn id="1" dur="indefinite" restart="never" nodeType="tmRoot"/>
+      </p:par>
+    </p:tnLst>
+  </p:timing>
 </p:sld>
 </file>
 
@@ -5663,6 +5747,13 @@
   <p:clrMapOvr>
     <a:masterClrMapping/>
   </p:clrMapOvr>
+  <p:timing>
+    <p:tnLst>
+      <p:par>
+        <p:cTn id="1" dur="indefinite" restart="never" nodeType="tmRoot"/>
+      </p:par>
+    </p:tnLst>
+  </p:timing>
 </p:sld>
 </file>
 
@@ -5792,6 +5883,13 @@
   <p:clrMapOvr>
     <a:masterClrMapping/>
   </p:clrMapOvr>
+  <p:timing>
+    <p:tnLst>
+      <p:par>
+        <p:cTn id="1" dur="indefinite" restart="never" nodeType="tmRoot"/>
+      </p:par>
+    </p:tnLst>
+  </p:timing>
 </p:sld>
 </file>
 
@@ -5919,6 +6017,13 @@
   <p:clrMapOvr>
     <a:masterClrMapping/>
   </p:clrMapOvr>
+  <p:timing>
+    <p:tnLst>
+      <p:par>
+        <p:cTn id="1" dur="indefinite" restart="never" nodeType="tmRoot"/>
+      </p:par>
+    </p:tnLst>
+  </p:timing>
 </p:sld>
 </file>
 
@@ -6051,6 +6156,13 @@
   <p:clrMapOvr>
     <a:masterClrMapping/>
   </p:clrMapOvr>
+  <p:timing>
+    <p:tnLst>
+      <p:par>
+        <p:cTn id="1" dur="indefinite" restart="never" nodeType="tmRoot"/>
+      </p:par>
+    </p:tnLst>
+  </p:timing>
 </p:sld>
 </file>
 
@@ -6160,6 +6272,13 @@
   <p:clrMapOvr>
     <a:masterClrMapping/>
   </p:clrMapOvr>
+  <p:timing>
+    <p:tnLst>
+      <p:par>
+        <p:cTn id="1" dur="indefinite" restart="never" nodeType="tmRoot"/>
+      </p:par>
+    </p:tnLst>
+  </p:timing>
 </p:sld>
 </file>
 
@@ -6271,6 +6390,13 @@
   <p:clrMapOvr>
     <a:masterClrMapping/>
   </p:clrMapOvr>
+  <p:timing>
+    <p:tnLst>
+      <p:par>
+        <p:cTn id="1" dur="indefinite" restart="never" nodeType="tmRoot"/>
+      </p:par>
+    </p:tnLst>
+  </p:timing>
 </p:sld>
 </file>
 
@@ -6330,6 +6456,13 @@
   <p:clrMapOvr>
     <a:masterClrMapping/>
   </p:clrMapOvr>
+  <p:timing>
+    <p:tnLst>
+      <p:par>
+        <p:cTn id="1" dur="indefinite" restart="never" nodeType="tmRoot"/>
+      </p:par>
+    </p:tnLst>
+  </p:timing>
 </p:sld>
 </file>
 
@@ -6481,6 +6614,13 @@
   <p:clrMapOvr>
     <a:masterClrMapping/>
   </p:clrMapOvr>
+  <p:timing>
+    <p:tnLst>
+      <p:par>
+        <p:cTn id="1" dur="indefinite" restart="never" nodeType="tmRoot"/>
+      </p:par>
+    </p:tnLst>
+  </p:timing>
 </p:sld>
 </file>
 
@@ -6691,6 +6831,13 @@
   <p:clrMapOvr>
     <a:masterClrMapping/>
   </p:clrMapOvr>
+  <p:timing>
+    <p:tnLst>
+      <p:par>
+        <p:cTn id="1" dur="indefinite" restart="never" nodeType="tmRoot"/>
+      </p:par>
+    </p:tnLst>
+  </p:timing>
 </p:sld>
 </file>
 
@@ -7074,6 +7221,13 @@
   <p:clrMapOvr>
     <a:masterClrMapping/>
   </p:clrMapOvr>
+  <p:timing>
+    <p:tnLst>
+      <p:par>
+        <p:cTn id="1" dur="indefinite" restart="never" nodeType="tmRoot"/>
+      </p:par>
+    </p:tnLst>
+  </p:timing>
 </p:sld>
 </file>
 
@@ -7261,6 +7415,13 @@
   <p:clrMapOvr>
     <a:masterClrMapping/>
   </p:clrMapOvr>
+  <p:timing>
+    <p:tnLst>
+      <p:par>
+        <p:cTn id="1" dur="indefinite" restart="never" nodeType="tmRoot"/>
+      </p:par>
+    </p:tnLst>
+  </p:timing>
 </p:sld>
 </file>
 
@@ -7368,6 +7529,13 @@
   <p:clrMapOvr>
     <a:masterClrMapping/>
   </p:clrMapOvr>
+  <p:timing>
+    <p:tnLst>
+      <p:par>
+        <p:cTn id="1" dur="indefinite" restart="never" nodeType="tmRoot"/>
+      </p:par>
+    </p:tnLst>
+  </p:timing>
 </p:sld>
 </file>
 
@@ -7500,6 +7668,13 @@
   <p:clrMapOvr>
     <a:masterClrMapping/>
   </p:clrMapOvr>
+  <p:timing>
+    <p:tnLst>
+      <p:par>
+        <p:cTn id="1" dur="indefinite" restart="never" nodeType="tmRoot"/>
+      </p:par>
+    </p:tnLst>
+  </p:timing>
 </p:sld>
 </file>
 
@@ -7750,6 +7925,13 @@
   <p:clrMapOvr>
     <a:masterClrMapping/>
   </p:clrMapOvr>
+  <p:timing>
+    <p:tnLst>
+      <p:par>
+        <p:cTn id="1" dur="indefinite" restart="never" nodeType="tmRoot"/>
+      </p:par>
+    </p:tnLst>
+  </p:timing>
 </p:sld>
 </file>
 
@@ -8173,6 +8355,13 @@
   <p:clrMapOvr>
     <a:masterClrMapping/>
   </p:clrMapOvr>
+  <p:timing>
+    <p:tnLst>
+      <p:par>
+        <p:cTn id="1" dur="indefinite" restart="never" nodeType="tmRoot"/>
+      </p:par>
+    </p:tnLst>
+  </p:timing>
 </p:sld>
 </file>
 
@@ -8309,6 +8498,13 @@
   <p:clrMapOvr>
     <a:masterClrMapping/>
   </p:clrMapOvr>
+  <p:timing>
+    <p:tnLst>
+      <p:par>
+        <p:cTn id="1" dur="indefinite" restart="never" nodeType="tmRoot"/>
+      </p:par>
+    </p:tnLst>
+  </p:timing>
 </p:sld>
 </file>
 
@@ -8560,6 +8756,13 @@
   <p:clrMapOvr>
     <a:masterClrMapping/>
   </p:clrMapOvr>
+  <p:timing>
+    <p:tnLst>
+      <p:par>
+        <p:cTn id="1" dur="indefinite" restart="never" nodeType="tmRoot"/>
+      </p:par>
+    </p:tnLst>
+  </p:timing>
 </p:sld>
 </file>
 
@@ -8702,6 +8905,13 @@
   <p:clrMapOvr>
     <a:masterClrMapping/>
   </p:clrMapOvr>
+  <p:timing>
+    <p:tnLst>
+      <p:par>
+        <p:cTn id="1" dur="indefinite" restart="never" nodeType="tmRoot"/>
+      </p:par>
+    </p:tnLst>
+  </p:timing>
 </p:sld>
 </file>
 
@@ -8761,6 +8971,13 @@
   <p:clrMapOvr>
     <a:masterClrMapping/>
   </p:clrMapOvr>
+  <p:timing>
+    <p:tnLst>
+      <p:par>
+        <p:cTn id="1" dur="indefinite" restart="never" nodeType="tmRoot"/>
+      </p:par>
+    </p:tnLst>
+  </p:timing>
 </p:sld>
 </file>
 
@@ -8858,6 +9075,13 @@
   <p:clrMapOvr>
     <a:masterClrMapping/>
   </p:clrMapOvr>
+  <p:timing>
+    <p:tnLst>
+      <p:par>
+        <p:cTn id="1" dur="indefinite" restart="never" nodeType="tmRoot"/>
+      </p:par>
+    </p:tnLst>
+  </p:timing>
 </p:sld>
 </file>
 
@@ -8953,6 +9177,13 @@
   <p:clrMapOvr>
     <a:masterClrMapping/>
   </p:clrMapOvr>
+  <p:timing>
+    <p:tnLst>
+      <p:par>
+        <p:cTn id="1" dur="indefinite" restart="never" nodeType="tmRoot"/>
+      </p:par>
+    </p:tnLst>
+  </p:timing>
 </p:sld>
 </file>
 
@@ -9115,6 +9346,13 @@
   <p:clrMapOvr>
     <a:masterClrMapping/>
   </p:clrMapOvr>
+  <p:timing>
+    <p:tnLst>
+      <p:par>
+        <p:cTn id="1" dur="indefinite" restart="never" nodeType="tmRoot"/>
+      </p:par>
+    </p:tnLst>
+  </p:timing>
 </p:sld>
 </file>
 
@@ -9198,6 +9436,13 @@
   <p:clrMapOvr>
     <a:masterClrMapping/>
   </p:clrMapOvr>
+  <p:timing>
+    <p:tnLst>
+      <p:par>
+        <p:cTn id="1" dur="indefinite" restart="never" nodeType="tmRoot"/>
+      </p:par>
+    </p:tnLst>
+  </p:timing>
 </p:sld>
 </file>
 
@@ -9281,6 +9526,13 @@
   <p:clrMapOvr>
     <a:masterClrMapping/>
   </p:clrMapOvr>
+  <p:timing>
+    <p:tnLst>
+      <p:par>
+        <p:cTn id="1" dur="indefinite" restart="never" nodeType="tmRoot"/>
+      </p:par>
+    </p:tnLst>
+  </p:timing>
 </p:sld>
 </file>
 
@@ -9361,6 +9613,13 @@
   <p:clrMapOvr>
     <a:masterClrMapping/>
   </p:clrMapOvr>
+  <p:timing>
+    <p:tnLst>
+      <p:par>
+        <p:cTn id="1" dur="indefinite" restart="never" nodeType="tmRoot"/>
+      </p:par>
+    </p:tnLst>
+  </p:timing>
 </p:sld>
 </file>
 
@@ -9544,6 +9803,13 @@
   <p:clrMapOvr>
     <a:masterClrMapping/>
   </p:clrMapOvr>
+  <p:timing>
+    <p:tnLst>
+      <p:par>
+        <p:cTn id="1" dur="indefinite" restart="never" nodeType="tmRoot"/>
+      </p:par>
+    </p:tnLst>
+  </p:timing>
 </p:sld>
 </file>
 
@@ -9798,6 +10064,13 @@
   <p:clrMapOvr>
     <a:masterClrMapping/>
   </p:clrMapOvr>
+  <p:timing>
+    <p:tnLst>
+      <p:par>
+        <p:cTn id="1" dur="indefinite" restart="never" nodeType="tmRoot"/>
+      </p:par>
+    </p:tnLst>
+  </p:timing>
 </p:sld>
 </file>
 
@@ -9935,6 +10208,13 @@
   <p:clrMapOvr>
     <a:masterClrMapping/>
   </p:clrMapOvr>
+  <p:timing>
+    <p:tnLst>
+      <p:par>
+        <p:cTn id="1" dur="indefinite" restart="never" nodeType="tmRoot"/>
+      </p:par>
+    </p:tnLst>
+  </p:timing>
 </p:sld>
 </file>
 
@@ -10054,6 +10334,13 @@
   <p:clrMapOvr>
     <a:masterClrMapping/>
   </p:clrMapOvr>
+  <p:timing>
+    <p:tnLst>
+      <p:par>
+        <p:cTn id="1" dur="indefinite" restart="never" nodeType="tmRoot"/>
+      </p:par>
+    </p:tnLst>
+  </p:timing>
 </p:sld>
 </file>
 
@@ -10228,6 +10515,13 @@
   <p:clrMapOvr>
     <a:masterClrMapping/>
   </p:clrMapOvr>
+  <p:timing>
+    <p:tnLst>
+      <p:par>
+        <p:cTn id="1" dur="indefinite" restart="never" nodeType="tmRoot"/>
+      </p:par>
+    </p:tnLst>
+  </p:timing>
 </p:sld>
 </file>
 

</xml_diff>